<commit_message>
fixed errors in client
</commit_message>
<xml_diff>
--- a/Client/MISC/ISS_LAMP_PRESENTATION.pptx
+++ b/Client/MISC/ISS_LAMP_PRESENTATION.pptx
@@ -299,7 +299,7 @@
           <a:p>
             <a:fld id="{92F07814-BD9E-4400-973A-1B860BC413AF}" type="datetimeFigureOut">
               <a:rPr lang="da-DK" smtClean="0"/>
-              <a:t>03-12-2012</a:t>
+              <a:t>04-12-2012</a:t>
             </a:fld>
             <a:endParaRPr lang="da-DK"/>
           </a:p>
@@ -469,7 +469,7 @@
           <a:p>
             <a:fld id="{92F07814-BD9E-4400-973A-1B860BC413AF}" type="datetimeFigureOut">
               <a:rPr lang="da-DK" smtClean="0"/>
-              <a:t>03-12-2012</a:t>
+              <a:t>04-12-2012</a:t>
             </a:fld>
             <a:endParaRPr lang="da-DK"/>
           </a:p>
@@ -649,7 +649,7 @@
           <a:p>
             <a:fld id="{92F07814-BD9E-4400-973A-1B860BC413AF}" type="datetimeFigureOut">
               <a:rPr lang="da-DK" smtClean="0"/>
-              <a:t>03-12-2012</a:t>
+              <a:t>04-12-2012</a:t>
             </a:fld>
             <a:endParaRPr lang="da-DK"/>
           </a:p>
@@ -819,7 +819,7 @@
           <a:p>
             <a:fld id="{92F07814-BD9E-4400-973A-1B860BC413AF}" type="datetimeFigureOut">
               <a:rPr lang="da-DK" smtClean="0"/>
-              <a:t>03-12-2012</a:t>
+              <a:t>04-12-2012</a:t>
             </a:fld>
             <a:endParaRPr lang="da-DK"/>
           </a:p>
@@ -1065,7 +1065,7 @@
           <a:p>
             <a:fld id="{92F07814-BD9E-4400-973A-1B860BC413AF}" type="datetimeFigureOut">
               <a:rPr lang="da-DK" smtClean="0"/>
-              <a:t>03-12-2012</a:t>
+              <a:t>04-12-2012</a:t>
             </a:fld>
             <a:endParaRPr lang="da-DK"/>
           </a:p>
@@ -1353,7 +1353,7 @@
           <a:p>
             <a:fld id="{92F07814-BD9E-4400-973A-1B860BC413AF}" type="datetimeFigureOut">
               <a:rPr lang="da-DK" smtClean="0"/>
-              <a:t>03-12-2012</a:t>
+              <a:t>04-12-2012</a:t>
             </a:fld>
             <a:endParaRPr lang="da-DK"/>
           </a:p>
@@ -1775,7 +1775,7 @@
           <a:p>
             <a:fld id="{92F07814-BD9E-4400-973A-1B860BC413AF}" type="datetimeFigureOut">
               <a:rPr lang="da-DK" smtClean="0"/>
-              <a:t>03-12-2012</a:t>
+              <a:t>04-12-2012</a:t>
             </a:fld>
             <a:endParaRPr lang="da-DK"/>
           </a:p>
@@ -1893,7 +1893,7 @@
           <a:p>
             <a:fld id="{92F07814-BD9E-4400-973A-1B860BC413AF}" type="datetimeFigureOut">
               <a:rPr lang="da-DK" smtClean="0"/>
-              <a:t>03-12-2012</a:t>
+              <a:t>04-12-2012</a:t>
             </a:fld>
             <a:endParaRPr lang="da-DK"/>
           </a:p>
@@ -1988,7 +1988,7 @@
           <a:p>
             <a:fld id="{92F07814-BD9E-4400-973A-1B860BC413AF}" type="datetimeFigureOut">
               <a:rPr lang="da-DK" smtClean="0"/>
-              <a:t>03-12-2012</a:t>
+              <a:t>04-12-2012</a:t>
             </a:fld>
             <a:endParaRPr lang="da-DK"/>
           </a:p>
@@ -2265,7 +2265,7 @@
           <a:p>
             <a:fld id="{92F07814-BD9E-4400-973A-1B860BC413AF}" type="datetimeFigureOut">
               <a:rPr lang="da-DK" smtClean="0"/>
-              <a:t>03-12-2012</a:t>
+              <a:t>04-12-2012</a:t>
             </a:fld>
             <a:endParaRPr lang="da-DK"/>
           </a:p>
@@ -2518,7 +2518,7 @@
           <a:p>
             <a:fld id="{92F07814-BD9E-4400-973A-1B860BC413AF}" type="datetimeFigureOut">
               <a:rPr lang="da-DK" smtClean="0"/>
-              <a:t>03-12-2012</a:t>
+              <a:t>04-12-2012</a:t>
             </a:fld>
             <a:endParaRPr lang="da-DK"/>
           </a:p>
@@ -2731,7 +2731,7 @@
           <a:p>
             <a:fld id="{92F07814-BD9E-4400-973A-1B860BC413AF}" type="datetimeFigureOut">
               <a:rPr lang="da-DK" smtClean="0"/>
-              <a:t>03-12-2012</a:t>
+              <a:t>04-12-2012</a:t>
             </a:fld>
             <a:endParaRPr lang="da-DK"/>
           </a:p>
@@ -3347,7 +3347,7 @@
         </p:nvSpPr>
         <p:spPr>
           <a:xfrm>
-            <a:off x="457200" y="274638"/>
+            <a:off x="457200" y="2718048"/>
             <a:ext cx="8229600" cy="1143000"/>
           </a:xfrm>
         </p:spPr>
@@ -3355,17 +3355,17 @@
           <a:bodyPr/>
           <a:lstStyle/>
           <a:p>
-            <a:r>
-              <a:rPr lang="da-DK" dirty="0" err="1" smtClean="0">
-                <a:latin typeface="Bender" pitchFamily="50" charset="0"/>
-              </a:rPr>
-              <a:t>Python</a:t>
-            </a:r>
             <a:r>
               <a:rPr lang="da-DK" dirty="0" smtClean="0">
                 <a:latin typeface="Bender" pitchFamily="50" charset="0"/>
               </a:rPr>
-              <a:t> CODE</a:t>
+              <a:t>PYTHON </a:t>
+            </a:r>
+            <a:r>
+              <a:rPr lang="da-DK" dirty="0" smtClean="0">
+                <a:latin typeface="Bender" pitchFamily="50" charset="0"/>
+              </a:rPr>
+              <a:t>CODE</a:t>
             </a:r>
             <a:endParaRPr lang="da-DK" dirty="0">
               <a:latin typeface="Bender" pitchFamily="50" charset="0"/>
@@ -3413,7 +3413,12 @@
             <p:ph type="title"/>
           </p:nvPr>
         </p:nvSpPr>
-        <p:spPr/>
+        <p:spPr>
+          <a:xfrm>
+            <a:off x="457200" y="2574032"/>
+            <a:ext cx="8229600" cy="1143000"/>
+          </a:xfrm>
+        </p:spPr>
         <p:txBody>
           <a:bodyPr/>
           <a:lstStyle/>
@@ -5483,7 +5488,6 @@
               <a:rPr lang="da-DK" b="1" dirty="0"/>
               <a:t>:</a:t>
             </a:r>
-            <a:endParaRPr lang="da-DK" b="1" dirty="0"/>
           </a:p>
           <a:p>
             <a:r>
@@ -6019,7 +6023,7 @@
         </p:nvSpPr>
         <p:spPr>
           <a:xfrm>
-            <a:off x="457200" y="274638"/>
+            <a:off x="467544" y="2780928"/>
             <a:ext cx="8229600" cy="1143000"/>
           </a:xfrm>
         </p:spPr>

</xml_diff>